<commit_message>
So Do Use case, update FlowChart, update cay giao dien,dac ta de tai
</commit_message>
<xml_diff>
--- a/Giao dien/cay giao dien/Cây_PP.pptx
+++ b/Giao dien/cay giao dien/Cây_PP.pptx
@@ -113,7 +113,7 @@
   </p:defaultTextStyle>
   <p:extLst>
     <p:ext uri="{EFAFB233-063F-42B5-8137-9DF3F51BA10A}">
-      <p15:sldGuideLst xmlns:p15="http://schemas.microsoft.com/office/powerpoint/2012/main">
+      <p15:sldGuideLst xmlns:p15="http://schemas.microsoft.com/office/powerpoint/2012/main" xmlns="">
         <p15:guide id="1" orient="horz" pos="2160">
           <p15:clr>
             <a:srgbClr val="A4A3A4"/>
@@ -311,7 +311,7 @@
           <a:p>
             <a:fld id="{E21A0B8F-3A45-4870-B5D2-BAC75BDD1717}" type="datetimeFigureOut">
               <a:rPr lang="en-US" smtClean="0"/>
-              <a:t>09/10/2019</a:t>
+              <a:t>10/15/2019</a:t>
             </a:fld>
             <a:endParaRPr lang="en-US"/>
           </a:p>
@@ -481,7 +481,7 @@
           <a:p>
             <a:fld id="{E21A0B8F-3A45-4870-B5D2-BAC75BDD1717}" type="datetimeFigureOut">
               <a:rPr lang="en-US" smtClean="0"/>
-              <a:t>09/10/2019</a:t>
+              <a:t>10/15/2019</a:t>
             </a:fld>
             <a:endParaRPr lang="en-US"/>
           </a:p>
@@ -661,7 +661,7 @@
           <a:p>
             <a:fld id="{E21A0B8F-3A45-4870-B5D2-BAC75BDD1717}" type="datetimeFigureOut">
               <a:rPr lang="en-US" smtClean="0"/>
-              <a:t>09/10/2019</a:t>
+              <a:t>10/15/2019</a:t>
             </a:fld>
             <a:endParaRPr lang="en-US"/>
           </a:p>
@@ -831,7 +831,7 @@
           <a:p>
             <a:fld id="{E21A0B8F-3A45-4870-B5D2-BAC75BDD1717}" type="datetimeFigureOut">
               <a:rPr lang="en-US" smtClean="0"/>
-              <a:t>09/10/2019</a:t>
+              <a:t>10/15/2019</a:t>
             </a:fld>
             <a:endParaRPr lang="en-US"/>
           </a:p>
@@ -1077,7 +1077,7 @@
           <a:p>
             <a:fld id="{E21A0B8F-3A45-4870-B5D2-BAC75BDD1717}" type="datetimeFigureOut">
               <a:rPr lang="en-US" smtClean="0"/>
-              <a:t>09/10/2019</a:t>
+              <a:t>10/15/2019</a:t>
             </a:fld>
             <a:endParaRPr lang="en-US"/>
           </a:p>
@@ -1365,7 +1365,7 @@
           <a:p>
             <a:fld id="{E21A0B8F-3A45-4870-B5D2-BAC75BDD1717}" type="datetimeFigureOut">
               <a:rPr lang="en-US" smtClean="0"/>
-              <a:t>09/10/2019</a:t>
+              <a:t>10/15/2019</a:t>
             </a:fld>
             <a:endParaRPr lang="en-US"/>
           </a:p>
@@ -1787,7 +1787,7 @@
           <a:p>
             <a:fld id="{E21A0B8F-3A45-4870-B5D2-BAC75BDD1717}" type="datetimeFigureOut">
               <a:rPr lang="en-US" smtClean="0"/>
-              <a:t>09/10/2019</a:t>
+              <a:t>10/15/2019</a:t>
             </a:fld>
             <a:endParaRPr lang="en-US"/>
           </a:p>
@@ -1905,7 +1905,7 @@
           <a:p>
             <a:fld id="{E21A0B8F-3A45-4870-B5D2-BAC75BDD1717}" type="datetimeFigureOut">
               <a:rPr lang="en-US" smtClean="0"/>
-              <a:t>09/10/2019</a:t>
+              <a:t>10/15/2019</a:t>
             </a:fld>
             <a:endParaRPr lang="en-US"/>
           </a:p>
@@ -2000,7 +2000,7 @@
           <a:p>
             <a:fld id="{E21A0B8F-3A45-4870-B5D2-BAC75BDD1717}" type="datetimeFigureOut">
               <a:rPr lang="en-US" smtClean="0"/>
-              <a:t>09/10/2019</a:t>
+              <a:t>10/15/2019</a:t>
             </a:fld>
             <a:endParaRPr lang="en-US"/>
           </a:p>
@@ -2277,7 +2277,7 @@
           <a:p>
             <a:fld id="{E21A0B8F-3A45-4870-B5D2-BAC75BDD1717}" type="datetimeFigureOut">
               <a:rPr lang="en-US" smtClean="0"/>
-              <a:t>09/10/2019</a:t>
+              <a:t>10/15/2019</a:t>
             </a:fld>
             <a:endParaRPr lang="en-US"/>
           </a:p>
@@ -2530,7 +2530,7 @@
           <a:p>
             <a:fld id="{E21A0B8F-3A45-4870-B5D2-BAC75BDD1717}" type="datetimeFigureOut">
               <a:rPr lang="en-US" smtClean="0"/>
-              <a:t>09/10/2019</a:t>
+              <a:t>10/15/2019</a:t>
             </a:fld>
             <a:endParaRPr lang="en-US"/>
           </a:p>
@@ -2743,7 +2743,7 @@
           <a:p>
             <a:fld id="{E21A0B8F-3A45-4870-B5D2-BAC75BDD1717}" type="datetimeFigureOut">
               <a:rPr lang="en-US" smtClean="0"/>
-              <a:t>09/10/2019</a:t>
+              <a:t>10/15/2019</a:t>
             </a:fld>
             <a:endParaRPr lang="en-US"/>
           </a:p>
@@ -3299,7 +3299,7 @@
       </p:grpSpPr>
       <p:pic>
         <p:nvPicPr>
-          <p:cNvPr id="2" name="Picture 1"/>
+          <p:cNvPr id="3" name="Picture 2"/>
           <p:cNvPicPr>
             <a:picLocks noChangeAspect="1"/>
           </p:cNvPicPr>
@@ -3319,8 +3319,8 @@
         </p:blipFill>
         <p:spPr>
           <a:xfrm>
-            <a:off x="2588058" y="228600"/>
-            <a:ext cx="4648200" cy="6179993"/>
+            <a:off x="1682918" y="983673"/>
+            <a:ext cx="6353019" cy="5255568"/>
           </a:xfrm>
           <a:prstGeom prst="rect">
             <a:avLst/>
@@ -3405,7 +3405,7 @@
       </p:grpSpPr>
       <p:pic>
         <p:nvPicPr>
-          <p:cNvPr id="4" name="Picture 3"/>
+          <p:cNvPr id="2" name="Picture 1"/>
           <p:cNvPicPr>
             <a:picLocks noChangeAspect="1"/>
           </p:cNvPicPr>
@@ -3425,8 +3425,8 @@
         </p:blipFill>
         <p:spPr>
           <a:xfrm>
-            <a:off x="1752952" y="152400"/>
-            <a:ext cx="6494548" cy="6553200"/>
+            <a:off x="2029913" y="76200"/>
+            <a:ext cx="5293385" cy="6781800"/>
           </a:xfrm>
           <a:prstGeom prst="rect">
             <a:avLst/>
@@ -3441,7 +3441,7 @@
         </p:nvSpPr>
         <p:spPr>
           <a:xfrm>
-            <a:off x="4419600" y="533400"/>
+            <a:off x="4525764" y="143286"/>
             <a:ext cx="301686" cy="369332"/>
           </a:xfrm>
           <a:prstGeom prst="rect">
@@ -3455,7 +3455,7 @@
           <a:lstStyle/>
           <a:p>
             <a:r>
-              <a:rPr lang="en-US" b="1" smtClean="0">
+              <a:rPr lang="en-US" b="1" dirty="0" smtClean="0">
                 <a:solidFill>
                   <a:srgbClr val="FF0000"/>
                 </a:solidFill>

</xml_diff>